<commit_message>
Backup on own repo
</commit_message>
<xml_diff>
--- a/sesame_presentation.pptx
+++ b/sesame_presentation.pptx
@@ -114,7 +114,7 @@
   </p:defaultTextStyle>
   <p:extLst>
     <p:ext uri="{EFAFB233-063F-42B5-8137-9DF3F51BA10A}">
-      <p15:sldGuideLst xmlns:p15="http://schemas.microsoft.com/office/powerpoint/2012/main"/>
+      <p15:sldGuideLst xmlns:p15="http://schemas.microsoft.com/office/powerpoint/2012/main" xmlns=""/>
     </p:ext>
   </p:extLst>
 </p:presentation>
@@ -154,7 +154,7 @@
           <p:cNvPr id="2" name="Title 1">
             <a:extLst>
               <a:ext uri="{FF2B5EF4-FFF2-40B4-BE49-F238E27FC236}">
-                <a16:creationId xmlns:a16="http://schemas.microsoft.com/office/drawing/2014/main" id="{7B34BD46-FA9A-443B-A5E1-466AA47ABC9D}"/>
+                <a16:creationId xmlns:a16="http://schemas.microsoft.com/office/drawing/2014/main" xmlns="" id="{7B34BD46-FA9A-443B-A5E1-466AA47ABC9D}"/>
               </a:ext>
             </a:extLst>
           </p:cNvPr>
@@ -192,7 +192,7 @@
           <p:cNvPr id="3" name="Subtitle 2">
             <a:extLst>
               <a:ext uri="{FF2B5EF4-FFF2-40B4-BE49-F238E27FC236}">
-                <a16:creationId xmlns:a16="http://schemas.microsoft.com/office/drawing/2014/main" id="{B834B4A8-B70C-423A-A200-4CAD7DDDC44F}"/>
+                <a16:creationId xmlns:a16="http://schemas.microsoft.com/office/drawing/2014/main" xmlns="" id="{B834B4A8-B70C-423A-A200-4CAD7DDDC44F}"/>
               </a:ext>
             </a:extLst>
           </p:cNvPr>
@@ -263,7 +263,7 @@
           <p:cNvPr id="4" name="Date Placeholder 3">
             <a:extLst>
               <a:ext uri="{FF2B5EF4-FFF2-40B4-BE49-F238E27FC236}">
-                <a16:creationId xmlns:a16="http://schemas.microsoft.com/office/drawing/2014/main" id="{D4993CD9-DD76-4AD4-B1AB-56426714C752}"/>
+                <a16:creationId xmlns:a16="http://schemas.microsoft.com/office/drawing/2014/main" xmlns="" id="{D4993CD9-DD76-4AD4-B1AB-56426714C752}"/>
               </a:ext>
             </a:extLst>
           </p:cNvPr>
@@ -281,7 +281,7 @@
           <a:p>
             <a:fld id="{49DE2112-6E85-4D23-B7FF-3A510F2956E5}" type="datetimeFigureOut">
               <a:rPr lang="en-GB" smtClean="0"/>
-              <a:t>27/05/2018</a:t>
+              <a:t>27/05/18</a:t>
             </a:fld>
             <a:endParaRPr lang="en-GB"/>
           </a:p>
@@ -292,7 +292,7 @@
           <p:cNvPr id="5" name="Footer Placeholder 4">
             <a:extLst>
               <a:ext uri="{FF2B5EF4-FFF2-40B4-BE49-F238E27FC236}">
-                <a16:creationId xmlns:a16="http://schemas.microsoft.com/office/drawing/2014/main" id="{EBAE2FB5-BD3B-492D-9816-05A8874B52E2}"/>
+                <a16:creationId xmlns:a16="http://schemas.microsoft.com/office/drawing/2014/main" xmlns="" id="{EBAE2FB5-BD3B-492D-9816-05A8874B52E2}"/>
               </a:ext>
             </a:extLst>
           </p:cNvPr>
@@ -317,7 +317,7 @@
           <p:cNvPr id="6" name="Slide Number Placeholder 5">
             <a:extLst>
               <a:ext uri="{FF2B5EF4-FFF2-40B4-BE49-F238E27FC236}">
-                <a16:creationId xmlns:a16="http://schemas.microsoft.com/office/drawing/2014/main" id="{33A6DDF4-22F4-4EC3-B66F-9C9C640E1AEF}"/>
+                <a16:creationId xmlns:a16="http://schemas.microsoft.com/office/drawing/2014/main" xmlns="" id="{33A6DDF4-22F4-4EC3-B66F-9C9C640E1AEF}"/>
               </a:ext>
             </a:extLst>
           </p:cNvPr>
@@ -376,7 +376,7 @@
           <p:cNvPr id="2" name="Title 1">
             <a:extLst>
               <a:ext uri="{FF2B5EF4-FFF2-40B4-BE49-F238E27FC236}">
-                <a16:creationId xmlns:a16="http://schemas.microsoft.com/office/drawing/2014/main" id="{BC1481BE-86F1-47E8-AE4E-560643A940BC}"/>
+                <a16:creationId xmlns:a16="http://schemas.microsoft.com/office/drawing/2014/main" xmlns="" id="{BC1481BE-86F1-47E8-AE4E-560643A940BC}"/>
               </a:ext>
             </a:extLst>
           </p:cNvPr>
@@ -405,7 +405,7 @@
           <p:cNvPr id="3" name="Vertical Text Placeholder 2">
             <a:extLst>
               <a:ext uri="{FF2B5EF4-FFF2-40B4-BE49-F238E27FC236}">
-                <a16:creationId xmlns:a16="http://schemas.microsoft.com/office/drawing/2014/main" id="{0E3C259D-0588-47E6-AB68-470266F24802}"/>
+                <a16:creationId xmlns:a16="http://schemas.microsoft.com/office/drawing/2014/main" xmlns="" id="{0E3C259D-0588-47E6-AB68-470266F24802}"/>
               </a:ext>
             </a:extLst>
           </p:cNvPr>
@@ -463,7 +463,7 @@
           <p:cNvPr id="4" name="Date Placeholder 3">
             <a:extLst>
               <a:ext uri="{FF2B5EF4-FFF2-40B4-BE49-F238E27FC236}">
-                <a16:creationId xmlns:a16="http://schemas.microsoft.com/office/drawing/2014/main" id="{9C10DAC5-6136-4E19-816A-8EFF6E2567C0}"/>
+                <a16:creationId xmlns:a16="http://schemas.microsoft.com/office/drawing/2014/main" xmlns="" id="{9C10DAC5-6136-4E19-816A-8EFF6E2567C0}"/>
               </a:ext>
             </a:extLst>
           </p:cNvPr>
@@ -481,7 +481,7 @@
           <a:p>
             <a:fld id="{49DE2112-6E85-4D23-B7FF-3A510F2956E5}" type="datetimeFigureOut">
               <a:rPr lang="en-GB" smtClean="0"/>
-              <a:t>27/05/2018</a:t>
+              <a:t>27/05/18</a:t>
             </a:fld>
             <a:endParaRPr lang="en-GB"/>
           </a:p>
@@ -492,7 +492,7 @@
           <p:cNvPr id="5" name="Footer Placeholder 4">
             <a:extLst>
               <a:ext uri="{FF2B5EF4-FFF2-40B4-BE49-F238E27FC236}">
-                <a16:creationId xmlns:a16="http://schemas.microsoft.com/office/drawing/2014/main" id="{76BE502B-5885-4F90-802A-D6E0DA8F2DE3}"/>
+                <a16:creationId xmlns:a16="http://schemas.microsoft.com/office/drawing/2014/main" xmlns="" id="{76BE502B-5885-4F90-802A-D6E0DA8F2DE3}"/>
               </a:ext>
             </a:extLst>
           </p:cNvPr>
@@ -517,7 +517,7 @@
           <p:cNvPr id="6" name="Slide Number Placeholder 5">
             <a:extLst>
               <a:ext uri="{FF2B5EF4-FFF2-40B4-BE49-F238E27FC236}">
-                <a16:creationId xmlns:a16="http://schemas.microsoft.com/office/drawing/2014/main" id="{3302E8C3-DF40-47CC-BFDD-1451BBBBAC67}"/>
+                <a16:creationId xmlns:a16="http://schemas.microsoft.com/office/drawing/2014/main" xmlns="" id="{3302E8C3-DF40-47CC-BFDD-1451BBBBAC67}"/>
               </a:ext>
             </a:extLst>
           </p:cNvPr>
@@ -576,7 +576,7 @@
           <p:cNvPr id="2" name="Vertical Title 1">
             <a:extLst>
               <a:ext uri="{FF2B5EF4-FFF2-40B4-BE49-F238E27FC236}">
-                <a16:creationId xmlns:a16="http://schemas.microsoft.com/office/drawing/2014/main" id="{59CF9F01-CDD3-42DD-AD27-3DBF624F36E9}"/>
+                <a16:creationId xmlns:a16="http://schemas.microsoft.com/office/drawing/2014/main" xmlns="" id="{59CF9F01-CDD3-42DD-AD27-3DBF624F36E9}"/>
               </a:ext>
             </a:extLst>
           </p:cNvPr>
@@ -610,7 +610,7 @@
           <p:cNvPr id="3" name="Vertical Text Placeholder 2">
             <a:extLst>
               <a:ext uri="{FF2B5EF4-FFF2-40B4-BE49-F238E27FC236}">
-                <a16:creationId xmlns:a16="http://schemas.microsoft.com/office/drawing/2014/main" id="{484C4588-5C8E-4C64-A655-6D0004581328}"/>
+                <a16:creationId xmlns:a16="http://schemas.microsoft.com/office/drawing/2014/main" xmlns="" id="{484C4588-5C8E-4C64-A655-6D0004581328}"/>
               </a:ext>
             </a:extLst>
           </p:cNvPr>
@@ -673,7 +673,7 @@
           <p:cNvPr id="4" name="Date Placeholder 3">
             <a:extLst>
               <a:ext uri="{FF2B5EF4-FFF2-40B4-BE49-F238E27FC236}">
-                <a16:creationId xmlns:a16="http://schemas.microsoft.com/office/drawing/2014/main" id="{69F4ACAF-C306-443A-A098-83D43731523C}"/>
+                <a16:creationId xmlns:a16="http://schemas.microsoft.com/office/drawing/2014/main" xmlns="" id="{69F4ACAF-C306-443A-A098-83D43731523C}"/>
               </a:ext>
             </a:extLst>
           </p:cNvPr>
@@ -691,7 +691,7 @@
           <a:p>
             <a:fld id="{49DE2112-6E85-4D23-B7FF-3A510F2956E5}" type="datetimeFigureOut">
               <a:rPr lang="en-GB" smtClean="0"/>
-              <a:t>27/05/2018</a:t>
+              <a:t>27/05/18</a:t>
             </a:fld>
             <a:endParaRPr lang="en-GB"/>
           </a:p>
@@ -702,7 +702,7 @@
           <p:cNvPr id="5" name="Footer Placeholder 4">
             <a:extLst>
               <a:ext uri="{FF2B5EF4-FFF2-40B4-BE49-F238E27FC236}">
-                <a16:creationId xmlns:a16="http://schemas.microsoft.com/office/drawing/2014/main" id="{DACC3C8E-E6EB-4E9A-83E0-4293C977C638}"/>
+                <a16:creationId xmlns:a16="http://schemas.microsoft.com/office/drawing/2014/main" xmlns="" id="{DACC3C8E-E6EB-4E9A-83E0-4293C977C638}"/>
               </a:ext>
             </a:extLst>
           </p:cNvPr>
@@ -727,7 +727,7 @@
           <p:cNvPr id="6" name="Slide Number Placeholder 5">
             <a:extLst>
               <a:ext uri="{FF2B5EF4-FFF2-40B4-BE49-F238E27FC236}">
-                <a16:creationId xmlns:a16="http://schemas.microsoft.com/office/drawing/2014/main" id="{9480FBB8-F2EA-4D75-8A39-3489012F4C3C}"/>
+                <a16:creationId xmlns:a16="http://schemas.microsoft.com/office/drawing/2014/main" xmlns="" id="{9480FBB8-F2EA-4D75-8A39-3489012F4C3C}"/>
               </a:ext>
             </a:extLst>
           </p:cNvPr>
@@ -794,7 +794,7 @@
           <p:cNvPr id="2" name="Title 1">
             <a:extLst>
               <a:ext uri="{FF2B5EF4-FFF2-40B4-BE49-F238E27FC236}">
-                <a16:creationId xmlns:a16="http://schemas.microsoft.com/office/drawing/2014/main" id="{BA5A607B-116E-4C9F-9C6C-0A7AEDDD2115}"/>
+                <a16:creationId xmlns:a16="http://schemas.microsoft.com/office/drawing/2014/main" xmlns="" id="{BA5A607B-116E-4C9F-9C6C-0A7AEDDD2115}"/>
               </a:ext>
             </a:extLst>
           </p:cNvPr>
@@ -823,7 +823,7 @@
           <p:cNvPr id="3" name="Content Placeholder 2">
             <a:extLst>
               <a:ext uri="{FF2B5EF4-FFF2-40B4-BE49-F238E27FC236}">
-                <a16:creationId xmlns:a16="http://schemas.microsoft.com/office/drawing/2014/main" id="{F8E1A298-E23D-4C33-818F-E79B939828BF}"/>
+                <a16:creationId xmlns:a16="http://schemas.microsoft.com/office/drawing/2014/main" xmlns="" id="{F8E1A298-E23D-4C33-818F-E79B939828BF}"/>
               </a:ext>
             </a:extLst>
           </p:cNvPr>
@@ -881,7 +881,7 @@
           <p:cNvPr id="4" name="Date Placeholder 3">
             <a:extLst>
               <a:ext uri="{FF2B5EF4-FFF2-40B4-BE49-F238E27FC236}">
-                <a16:creationId xmlns:a16="http://schemas.microsoft.com/office/drawing/2014/main" id="{995342B2-B7D1-459D-A953-A9D9F28155B3}"/>
+                <a16:creationId xmlns:a16="http://schemas.microsoft.com/office/drawing/2014/main" xmlns="" id="{995342B2-B7D1-459D-A953-A9D9F28155B3}"/>
               </a:ext>
             </a:extLst>
           </p:cNvPr>
@@ -899,7 +899,7 @@
           <a:p>
             <a:fld id="{49DE2112-6E85-4D23-B7FF-3A510F2956E5}" type="datetimeFigureOut">
               <a:rPr lang="en-GB" smtClean="0"/>
-              <a:t>27/05/2018</a:t>
+              <a:t>27/05/18</a:t>
             </a:fld>
             <a:endParaRPr lang="en-GB"/>
           </a:p>
@@ -910,7 +910,7 @@
           <p:cNvPr id="5" name="Footer Placeholder 4">
             <a:extLst>
               <a:ext uri="{FF2B5EF4-FFF2-40B4-BE49-F238E27FC236}">
-                <a16:creationId xmlns:a16="http://schemas.microsoft.com/office/drawing/2014/main" id="{1B0ACBCA-D977-4202-B82E-3B803A88EC38}"/>
+                <a16:creationId xmlns:a16="http://schemas.microsoft.com/office/drawing/2014/main" xmlns="" id="{1B0ACBCA-D977-4202-B82E-3B803A88EC38}"/>
               </a:ext>
             </a:extLst>
           </p:cNvPr>
@@ -935,7 +935,7 @@
           <p:cNvPr id="6" name="Slide Number Placeholder 5">
             <a:extLst>
               <a:ext uri="{FF2B5EF4-FFF2-40B4-BE49-F238E27FC236}">
-                <a16:creationId xmlns:a16="http://schemas.microsoft.com/office/drawing/2014/main" id="{580E0EB2-B83F-42BD-87E0-C8053BCB352C}"/>
+                <a16:creationId xmlns:a16="http://schemas.microsoft.com/office/drawing/2014/main" xmlns="" id="{580E0EB2-B83F-42BD-87E0-C8053BCB352C}"/>
               </a:ext>
             </a:extLst>
           </p:cNvPr>
@@ -1002,7 +1002,7 @@
           <p:cNvPr id="2" name="Title 1">
             <a:extLst>
               <a:ext uri="{FF2B5EF4-FFF2-40B4-BE49-F238E27FC236}">
-                <a16:creationId xmlns:a16="http://schemas.microsoft.com/office/drawing/2014/main" id="{078F0272-98BF-4332-9801-3E20F5EF255F}"/>
+                <a16:creationId xmlns:a16="http://schemas.microsoft.com/office/drawing/2014/main" xmlns="" id="{078F0272-98BF-4332-9801-3E20F5EF255F}"/>
               </a:ext>
             </a:extLst>
           </p:cNvPr>
@@ -1040,7 +1040,7 @@
           <p:cNvPr id="3" name="Text Placeholder 2">
             <a:extLst>
               <a:ext uri="{FF2B5EF4-FFF2-40B4-BE49-F238E27FC236}">
-                <a16:creationId xmlns:a16="http://schemas.microsoft.com/office/drawing/2014/main" id="{C332A65F-17F0-46C7-89EA-AD171F61D517}"/>
+                <a16:creationId xmlns:a16="http://schemas.microsoft.com/office/drawing/2014/main" xmlns="" id="{C332A65F-17F0-46C7-89EA-AD171F61D517}"/>
               </a:ext>
             </a:extLst>
           </p:cNvPr>
@@ -1165,7 +1165,7 @@
           <p:cNvPr id="4" name="Date Placeholder 3">
             <a:extLst>
               <a:ext uri="{FF2B5EF4-FFF2-40B4-BE49-F238E27FC236}">
-                <a16:creationId xmlns:a16="http://schemas.microsoft.com/office/drawing/2014/main" id="{7C439807-AB6D-4A80-A218-237F7E89BDE3}"/>
+                <a16:creationId xmlns:a16="http://schemas.microsoft.com/office/drawing/2014/main" xmlns="" id="{7C439807-AB6D-4A80-A218-237F7E89BDE3}"/>
               </a:ext>
             </a:extLst>
           </p:cNvPr>
@@ -1183,7 +1183,7 @@
           <a:p>
             <a:fld id="{49DE2112-6E85-4D23-B7FF-3A510F2956E5}" type="datetimeFigureOut">
               <a:rPr lang="en-GB" smtClean="0"/>
-              <a:t>27/05/2018</a:t>
+              <a:t>27/05/18</a:t>
             </a:fld>
             <a:endParaRPr lang="en-GB"/>
           </a:p>
@@ -1194,7 +1194,7 @@
           <p:cNvPr id="5" name="Footer Placeholder 4">
             <a:extLst>
               <a:ext uri="{FF2B5EF4-FFF2-40B4-BE49-F238E27FC236}">
-                <a16:creationId xmlns:a16="http://schemas.microsoft.com/office/drawing/2014/main" id="{AA7B41A0-B443-4228-9896-4BD229BDE03A}"/>
+                <a16:creationId xmlns:a16="http://schemas.microsoft.com/office/drawing/2014/main" xmlns="" id="{AA7B41A0-B443-4228-9896-4BD229BDE03A}"/>
               </a:ext>
             </a:extLst>
           </p:cNvPr>
@@ -1219,7 +1219,7 @@
           <p:cNvPr id="6" name="Slide Number Placeholder 5">
             <a:extLst>
               <a:ext uri="{FF2B5EF4-FFF2-40B4-BE49-F238E27FC236}">
-                <a16:creationId xmlns:a16="http://schemas.microsoft.com/office/drawing/2014/main" id="{2E47A292-FCB6-4B52-AD5D-296EF881B186}"/>
+                <a16:creationId xmlns:a16="http://schemas.microsoft.com/office/drawing/2014/main" xmlns="" id="{2E47A292-FCB6-4B52-AD5D-296EF881B186}"/>
               </a:ext>
             </a:extLst>
           </p:cNvPr>
@@ -1278,7 +1278,7 @@
           <p:cNvPr id="2" name="Title 1">
             <a:extLst>
               <a:ext uri="{FF2B5EF4-FFF2-40B4-BE49-F238E27FC236}">
-                <a16:creationId xmlns:a16="http://schemas.microsoft.com/office/drawing/2014/main" id="{2595D926-2FDD-4ED9-BAB7-7B7E04DDD13F}"/>
+                <a16:creationId xmlns:a16="http://schemas.microsoft.com/office/drawing/2014/main" xmlns="" id="{2595D926-2FDD-4ED9-BAB7-7B7E04DDD13F}"/>
               </a:ext>
             </a:extLst>
           </p:cNvPr>
@@ -1307,7 +1307,7 @@
           <p:cNvPr id="3" name="Content Placeholder 2">
             <a:extLst>
               <a:ext uri="{FF2B5EF4-FFF2-40B4-BE49-F238E27FC236}">
-                <a16:creationId xmlns:a16="http://schemas.microsoft.com/office/drawing/2014/main" id="{976689CA-A5E5-4595-B9FA-C4C5F32489B4}"/>
+                <a16:creationId xmlns:a16="http://schemas.microsoft.com/office/drawing/2014/main" xmlns="" id="{976689CA-A5E5-4595-B9FA-C4C5F32489B4}"/>
               </a:ext>
             </a:extLst>
           </p:cNvPr>
@@ -1370,7 +1370,7 @@
           <p:cNvPr id="4" name="Content Placeholder 3">
             <a:extLst>
               <a:ext uri="{FF2B5EF4-FFF2-40B4-BE49-F238E27FC236}">
-                <a16:creationId xmlns:a16="http://schemas.microsoft.com/office/drawing/2014/main" id="{C3200CF7-E4CC-4FA7-AF3E-25BA6CADA6EB}"/>
+                <a16:creationId xmlns:a16="http://schemas.microsoft.com/office/drawing/2014/main" xmlns="" id="{C3200CF7-E4CC-4FA7-AF3E-25BA6CADA6EB}"/>
               </a:ext>
             </a:extLst>
           </p:cNvPr>
@@ -1433,7 +1433,7 @@
           <p:cNvPr id="5" name="Date Placeholder 4">
             <a:extLst>
               <a:ext uri="{FF2B5EF4-FFF2-40B4-BE49-F238E27FC236}">
-                <a16:creationId xmlns:a16="http://schemas.microsoft.com/office/drawing/2014/main" id="{9733A5FA-BFA8-474E-924E-D278A1FEF3DB}"/>
+                <a16:creationId xmlns:a16="http://schemas.microsoft.com/office/drawing/2014/main" xmlns="" id="{9733A5FA-BFA8-474E-924E-D278A1FEF3DB}"/>
               </a:ext>
             </a:extLst>
           </p:cNvPr>
@@ -1451,7 +1451,7 @@
           <a:p>
             <a:fld id="{49DE2112-6E85-4D23-B7FF-3A510F2956E5}" type="datetimeFigureOut">
               <a:rPr lang="en-GB" smtClean="0"/>
-              <a:t>27/05/2018</a:t>
+              <a:t>27/05/18</a:t>
             </a:fld>
             <a:endParaRPr lang="en-GB"/>
           </a:p>
@@ -1462,7 +1462,7 @@
           <p:cNvPr id="6" name="Footer Placeholder 5">
             <a:extLst>
               <a:ext uri="{FF2B5EF4-FFF2-40B4-BE49-F238E27FC236}">
-                <a16:creationId xmlns:a16="http://schemas.microsoft.com/office/drawing/2014/main" id="{82BD85CD-DFC4-4B77-9F4B-788C560D9F62}"/>
+                <a16:creationId xmlns:a16="http://schemas.microsoft.com/office/drawing/2014/main" xmlns="" id="{82BD85CD-DFC4-4B77-9F4B-788C560D9F62}"/>
               </a:ext>
             </a:extLst>
           </p:cNvPr>
@@ -1487,7 +1487,7 @@
           <p:cNvPr id="7" name="Slide Number Placeholder 6">
             <a:extLst>
               <a:ext uri="{FF2B5EF4-FFF2-40B4-BE49-F238E27FC236}">
-                <a16:creationId xmlns:a16="http://schemas.microsoft.com/office/drawing/2014/main" id="{EDCB7442-509C-41D7-BE43-CB64F7A22269}"/>
+                <a16:creationId xmlns:a16="http://schemas.microsoft.com/office/drawing/2014/main" xmlns="" id="{EDCB7442-509C-41D7-BE43-CB64F7A22269}"/>
               </a:ext>
             </a:extLst>
           </p:cNvPr>
@@ -1546,7 +1546,7 @@
           <p:cNvPr id="2" name="Title 1">
             <a:extLst>
               <a:ext uri="{FF2B5EF4-FFF2-40B4-BE49-F238E27FC236}">
-                <a16:creationId xmlns:a16="http://schemas.microsoft.com/office/drawing/2014/main" id="{7D86C2C7-58A6-4874-B656-8AE80E58A72B}"/>
+                <a16:creationId xmlns:a16="http://schemas.microsoft.com/office/drawing/2014/main" xmlns="" id="{7D86C2C7-58A6-4874-B656-8AE80E58A72B}"/>
               </a:ext>
             </a:extLst>
           </p:cNvPr>
@@ -1580,7 +1580,7 @@
           <p:cNvPr id="3" name="Text Placeholder 2">
             <a:extLst>
               <a:ext uri="{FF2B5EF4-FFF2-40B4-BE49-F238E27FC236}">
-                <a16:creationId xmlns:a16="http://schemas.microsoft.com/office/drawing/2014/main" id="{ECFD8126-55C1-49E7-A148-3135021A5630}"/>
+                <a16:creationId xmlns:a16="http://schemas.microsoft.com/office/drawing/2014/main" xmlns="" id="{ECFD8126-55C1-49E7-A148-3135021A5630}"/>
               </a:ext>
             </a:extLst>
           </p:cNvPr>
@@ -1651,7 +1651,7 @@
           <p:cNvPr id="4" name="Content Placeholder 3">
             <a:extLst>
               <a:ext uri="{FF2B5EF4-FFF2-40B4-BE49-F238E27FC236}">
-                <a16:creationId xmlns:a16="http://schemas.microsoft.com/office/drawing/2014/main" id="{E919BE27-8718-43EB-BE04-4AA21788C91D}"/>
+                <a16:creationId xmlns:a16="http://schemas.microsoft.com/office/drawing/2014/main" xmlns="" id="{E919BE27-8718-43EB-BE04-4AA21788C91D}"/>
               </a:ext>
             </a:extLst>
           </p:cNvPr>
@@ -1714,7 +1714,7 @@
           <p:cNvPr id="5" name="Text Placeholder 4">
             <a:extLst>
               <a:ext uri="{FF2B5EF4-FFF2-40B4-BE49-F238E27FC236}">
-                <a16:creationId xmlns:a16="http://schemas.microsoft.com/office/drawing/2014/main" id="{EF090484-2ACB-47B5-9304-7BFCE62E0D62}"/>
+                <a16:creationId xmlns:a16="http://schemas.microsoft.com/office/drawing/2014/main" xmlns="" id="{EF090484-2ACB-47B5-9304-7BFCE62E0D62}"/>
               </a:ext>
             </a:extLst>
           </p:cNvPr>
@@ -1785,7 +1785,7 @@
           <p:cNvPr id="6" name="Content Placeholder 5">
             <a:extLst>
               <a:ext uri="{FF2B5EF4-FFF2-40B4-BE49-F238E27FC236}">
-                <a16:creationId xmlns:a16="http://schemas.microsoft.com/office/drawing/2014/main" id="{D66736EF-F00F-4F53-B43F-6006BE666A91}"/>
+                <a16:creationId xmlns:a16="http://schemas.microsoft.com/office/drawing/2014/main" xmlns="" id="{D66736EF-F00F-4F53-B43F-6006BE666A91}"/>
               </a:ext>
             </a:extLst>
           </p:cNvPr>
@@ -1848,7 +1848,7 @@
           <p:cNvPr id="7" name="Date Placeholder 6">
             <a:extLst>
               <a:ext uri="{FF2B5EF4-FFF2-40B4-BE49-F238E27FC236}">
-                <a16:creationId xmlns:a16="http://schemas.microsoft.com/office/drawing/2014/main" id="{D4048728-E879-4819-9732-13992267B563}"/>
+                <a16:creationId xmlns:a16="http://schemas.microsoft.com/office/drawing/2014/main" xmlns="" id="{D4048728-E879-4819-9732-13992267B563}"/>
               </a:ext>
             </a:extLst>
           </p:cNvPr>
@@ -1866,7 +1866,7 @@
           <a:p>
             <a:fld id="{49DE2112-6E85-4D23-B7FF-3A510F2956E5}" type="datetimeFigureOut">
               <a:rPr lang="en-GB" smtClean="0"/>
-              <a:t>27/05/2018</a:t>
+              <a:t>27/05/18</a:t>
             </a:fld>
             <a:endParaRPr lang="en-GB"/>
           </a:p>
@@ -1877,7 +1877,7 @@
           <p:cNvPr id="8" name="Footer Placeholder 7">
             <a:extLst>
               <a:ext uri="{FF2B5EF4-FFF2-40B4-BE49-F238E27FC236}">
-                <a16:creationId xmlns:a16="http://schemas.microsoft.com/office/drawing/2014/main" id="{969FBEA9-3D10-4009-9218-22CF66E137B6}"/>
+                <a16:creationId xmlns:a16="http://schemas.microsoft.com/office/drawing/2014/main" xmlns="" id="{969FBEA9-3D10-4009-9218-22CF66E137B6}"/>
               </a:ext>
             </a:extLst>
           </p:cNvPr>
@@ -1902,7 +1902,7 @@
           <p:cNvPr id="9" name="Slide Number Placeholder 8">
             <a:extLst>
               <a:ext uri="{FF2B5EF4-FFF2-40B4-BE49-F238E27FC236}">
-                <a16:creationId xmlns:a16="http://schemas.microsoft.com/office/drawing/2014/main" id="{50E508D9-3EF9-4D7B-BB1C-696ECD3A7E14}"/>
+                <a16:creationId xmlns:a16="http://schemas.microsoft.com/office/drawing/2014/main" xmlns="" id="{50E508D9-3EF9-4D7B-BB1C-696ECD3A7E14}"/>
               </a:ext>
             </a:extLst>
           </p:cNvPr>
@@ -1961,7 +1961,7 @@
           <p:cNvPr id="2" name="Title 1">
             <a:extLst>
               <a:ext uri="{FF2B5EF4-FFF2-40B4-BE49-F238E27FC236}">
-                <a16:creationId xmlns:a16="http://schemas.microsoft.com/office/drawing/2014/main" id="{26A4E160-C554-4A01-A2CD-29FFF6B823D1}"/>
+                <a16:creationId xmlns:a16="http://schemas.microsoft.com/office/drawing/2014/main" xmlns="" id="{26A4E160-C554-4A01-A2CD-29FFF6B823D1}"/>
               </a:ext>
             </a:extLst>
           </p:cNvPr>
@@ -1990,7 +1990,7 @@
           <p:cNvPr id="3" name="Date Placeholder 2">
             <a:extLst>
               <a:ext uri="{FF2B5EF4-FFF2-40B4-BE49-F238E27FC236}">
-                <a16:creationId xmlns:a16="http://schemas.microsoft.com/office/drawing/2014/main" id="{9A74EBBA-CC9F-409A-85A4-4815AED25D14}"/>
+                <a16:creationId xmlns:a16="http://schemas.microsoft.com/office/drawing/2014/main" xmlns="" id="{9A74EBBA-CC9F-409A-85A4-4815AED25D14}"/>
               </a:ext>
             </a:extLst>
           </p:cNvPr>
@@ -2008,7 +2008,7 @@
           <a:p>
             <a:fld id="{49DE2112-6E85-4D23-B7FF-3A510F2956E5}" type="datetimeFigureOut">
               <a:rPr lang="en-GB" smtClean="0"/>
-              <a:t>27/05/2018</a:t>
+              <a:t>27/05/18</a:t>
             </a:fld>
             <a:endParaRPr lang="en-GB"/>
           </a:p>
@@ -2019,7 +2019,7 @@
           <p:cNvPr id="4" name="Footer Placeholder 3">
             <a:extLst>
               <a:ext uri="{FF2B5EF4-FFF2-40B4-BE49-F238E27FC236}">
-                <a16:creationId xmlns:a16="http://schemas.microsoft.com/office/drawing/2014/main" id="{E0E79321-2462-4A57-B34D-B82AA4971328}"/>
+                <a16:creationId xmlns:a16="http://schemas.microsoft.com/office/drawing/2014/main" xmlns="" id="{E0E79321-2462-4A57-B34D-B82AA4971328}"/>
               </a:ext>
             </a:extLst>
           </p:cNvPr>
@@ -2044,7 +2044,7 @@
           <p:cNvPr id="5" name="Slide Number Placeholder 4">
             <a:extLst>
               <a:ext uri="{FF2B5EF4-FFF2-40B4-BE49-F238E27FC236}">
-                <a16:creationId xmlns:a16="http://schemas.microsoft.com/office/drawing/2014/main" id="{0457C1A8-B0C3-40FD-8510-AAE793DFAEAF}"/>
+                <a16:creationId xmlns:a16="http://schemas.microsoft.com/office/drawing/2014/main" xmlns="" id="{0457C1A8-B0C3-40FD-8510-AAE793DFAEAF}"/>
               </a:ext>
             </a:extLst>
           </p:cNvPr>
@@ -2111,7 +2111,7 @@
           <p:cNvPr id="2" name="Date Placeholder 1">
             <a:extLst>
               <a:ext uri="{FF2B5EF4-FFF2-40B4-BE49-F238E27FC236}">
-                <a16:creationId xmlns:a16="http://schemas.microsoft.com/office/drawing/2014/main" id="{149DDF6C-355F-451D-B4F8-4D4AFD6FD266}"/>
+                <a16:creationId xmlns:a16="http://schemas.microsoft.com/office/drawing/2014/main" xmlns="" id="{149DDF6C-355F-451D-B4F8-4D4AFD6FD266}"/>
               </a:ext>
             </a:extLst>
           </p:cNvPr>
@@ -2129,7 +2129,7 @@
           <a:p>
             <a:fld id="{49DE2112-6E85-4D23-B7FF-3A510F2956E5}" type="datetimeFigureOut">
               <a:rPr lang="en-GB" smtClean="0"/>
-              <a:t>27/05/2018</a:t>
+              <a:t>27/05/18</a:t>
             </a:fld>
             <a:endParaRPr lang="en-GB"/>
           </a:p>
@@ -2140,7 +2140,7 @@
           <p:cNvPr id="3" name="Footer Placeholder 2">
             <a:extLst>
               <a:ext uri="{FF2B5EF4-FFF2-40B4-BE49-F238E27FC236}">
-                <a16:creationId xmlns:a16="http://schemas.microsoft.com/office/drawing/2014/main" id="{529B8E3B-8D7B-495A-B11D-65FFA4B7A121}"/>
+                <a16:creationId xmlns:a16="http://schemas.microsoft.com/office/drawing/2014/main" xmlns="" id="{529B8E3B-8D7B-495A-B11D-65FFA4B7A121}"/>
               </a:ext>
             </a:extLst>
           </p:cNvPr>
@@ -2165,7 +2165,7 @@
           <p:cNvPr id="4" name="Slide Number Placeholder 3">
             <a:extLst>
               <a:ext uri="{FF2B5EF4-FFF2-40B4-BE49-F238E27FC236}">
-                <a16:creationId xmlns:a16="http://schemas.microsoft.com/office/drawing/2014/main" id="{1942EF60-CEE1-4E47-95BA-C3069C269CAD}"/>
+                <a16:creationId xmlns:a16="http://schemas.microsoft.com/office/drawing/2014/main" xmlns="" id="{1942EF60-CEE1-4E47-95BA-C3069C269CAD}"/>
               </a:ext>
             </a:extLst>
           </p:cNvPr>
@@ -2224,7 +2224,7 @@
           <p:cNvPr id="2" name="Title 1">
             <a:extLst>
               <a:ext uri="{FF2B5EF4-FFF2-40B4-BE49-F238E27FC236}">
-                <a16:creationId xmlns:a16="http://schemas.microsoft.com/office/drawing/2014/main" id="{24254FF0-F980-40DF-998F-5DCF255AE280}"/>
+                <a16:creationId xmlns:a16="http://schemas.microsoft.com/office/drawing/2014/main" xmlns="" id="{24254FF0-F980-40DF-998F-5DCF255AE280}"/>
               </a:ext>
             </a:extLst>
           </p:cNvPr>
@@ -2262,7 +2262,7 @@
           <p:cNvPr id="3" name="Content Placeholder 2">
             <a:extLst>
               <a:ext uri="{FF2B5EF4-FFF2-40B4-BE49-F238E27FC236}">
-                <a16:creationId xmlns:a16="http://schemas.microsoft.com/office/drawing/2014/main" id="{BBD37BAF-8F55-4F11-8540-1B0B7BDA974C}"/>
+                <a16:creationId xmlns:a16="http://schemas.microsoft.com/office/drawing/2014/main" xmlns="" id="{BBD37BAF-8F55-4F11-8540-1B0B7BDA974C}"/>
               </a:ext>
             </a:extLst>
           </p:cNvPr>
@@ -2353,7 +2353,7 @@
           <p:cNvPr id="4" name="Text Placeholder 3">
             <a:extLst>
               <a:ext uri="{FF2B5EF4-FFF2-40B4-BE49-F238E27FC236}">
-                <a16:creationId xmlns:a16="http://schemas.microsoft.com/office/drawing/2014/main" id="{CA62F2B6-20A1-4DC0-981F-93118DC38439}"/>
+                <a16:creationId xmlns:a16="http://schemas.microsoft.com/office/drawing/2014/main" xmlns="" id="{CA62F2B6-20A1-4DC0-981F-93118DC38439}"/>
               </a:ext>
             </a:extLst>
           </p:cNvPr>
@@ -2424,7 +2424,7 @@
           <p:cNvPr id="5" name="Date Placeholder 4">
             <a:extLst>
               <a:ext uri="{FF2B5EF4-FFF2-40B4-BE49-F238E27FC236}">
-                <a16:creationId xmlns:a16="http://schemas.microsoft.com/office/drawing/2014/main" id="{77387613-2456-4DFE-8FDB-3FB34B226C9E}"/>
+                <a16:creationId xmlns:a16="http://schemas.microsoft.com/office/drawing/2014/main" xmlns="" id="{77387613-2456-4DFE-8FDB-3FB34B226C9E}"/>
               </a:ext>
             </a:extLst>
           </p:cNvPr>
@@ -2442,7 +2442,7 @@
           <a:p>
             <a:fld id="{49DE2112-6E85-4D23-B7FF-3A510F2956E5}" type="datetimeFigureOut">
               <a:rPr lang="en-GB" smtClean="0"/>
-              <a:t>27/05/2018</a:t>
+              <a:t>27/05/18</a:t>
             </a:fld>
             <a:endParaRPr lang="en-GB"/>
           </a:p>
@@ -2453,7 +2453,7 @@
           <p:cNvPr id="6" name="Footer Placeholder 5">
             <a:extLst>
               <a:ext uri="{FF2B5EF4-FFF2-40B4-BE49-F238E27FC236}">
-                <a16:creationId xmlns:a16="http://schemas.microsoft.com/office/drawing/2014/main" id="{16EB56AF-BAFA-4473-B12E-862843962367}"/>
+                <a16:creationId xmlns:a16="http://schemas.microsoft.com/office/drawing/2014/main" xmlns="" id="{16EB56AF-BAFA-4473-B12E-862843962367}"/>
               </a:ext>
             </a:extLst>
           </p:cNvPr>
@@ -2478,7 +2478,7 @@
           <p:cNvPr id="7" name="Slide Number Placeholder 6">
             <a:extLst>
               <a:ext uri="{FF2B5EF4-FFF2-40B4-BE49-F238E27FC236}">
-                <a16:creationId xmlns:a16="http://schemas.microsoft.com/office/drawing/2014/main" id="{F3E9E5C2-1923-4057-B275-8AD6AD2B0B8D}"/>
+                <a16:creationId xmlns:a16="http://schemas.microsoft.com/office/drawing/2014/main" xmlns="" id="{F3E9E5C2-1923-4057-B275-8AD6AD2B0B8D}"/>
               </a:ext>
             </a:extLst>
           </p:cNvPr>
@@ -2537,7 +2537,7 @@
           <p:cNvPr id="2" name="Title 1">
             <a:extLst>
               <a:ext uri="{FF2B5EF4-FFF2-40B4-BE49-F238E27FC236}">
-                <a16:creationId xmlns:a16="http://schemas.microsoft.com/office/drawing/2014/main" id="{5E7F2401-9B88-47FD-8F97-A488E414C3A1}"/>
+                <a16:creationId xmlns:a16="http://schemas.microsoft.com/office/drawing/2014/main" xmlns="" id="{5E7F2401-9B88-47FD-8F97-A488E414C3A1}"/>
               </a:ext>
             </a:extLst>
           </p:cNvPr>
@@ -2575,7 +2575,7 @@
           <p:cNvPr id="3" name="Picture Placeholder 2">
             <a:extLst>
               <a:ext uri="{FF2B5EF4-FFF2-40B4-BE49-F238E27FC236}">
-                <a16:creationId xmlns:a16="http://schemas.microsoft.com/office/drawing/2014/main" id="{7C290532-4F26-4A71-8120-B1B2CDCBC74C}"/>
+                <a16:creationId xmlns:a16="http://schemas.microsoft.com/office/drawing/2014/main" xmlns="" id="{7C290532-4F26-4A71-8120-B1B2CDCBC74C}"/>
               </a:ext>
             </a:extLst>
           </p:cNvPr>
@@ -2642,7 +2642,7 @@
           <p:cNvPr id="4" name="Text Placeholder 3">
             <a:extLst>
               <a:ext uri="{FF2B5EF4-FFF2-40B4-BE49-F238E27FC236}">
-                <a16:creationId xmlns:a16="http://schemas.microsoft.com/office/drawing/2014/main" id="{F344DABA-F6F8-4F89-B0EE-2BF77FAA8F70}"/>
+                <a16:creationId xmlns:a16="http://schemas.microsoft.com/office/drawing/2014/main" xmlns="" id="{F344DABA-F6F8-4F89-B0EE-2BF77FAA8F70}"/>
               </a:ext>
             </a:extLst>
           </p:cNvPr>
@@ -2713,7 +2713,7 @@
           <p:cNvPr id="5" name="Date Placeholder 4">
             <a:extLst>
               <a:ext uri="{FF2B5EF4-FFF2-40B4-BE49-F238E27FC236}">
-                <a16:creationId xmlns:a16="http://schemas.microsoft.com/office/drawing/2014/main" id="{98E4BB4F-8814-4DC0-8A97-77D36D64704E}"/>
+                <a16:creationId xmlns:a16="http://schemas.microsoft.com/office/drawing/2014/main" xmlns="" id="{98E4BB4F-8814-4DC0-8A97-77D36D64704E}"/>
               </a:ext>
             </a:extLst>
           </p:cNvPr>
@@ -2731,7 +2731,7 @@
           <a:p>
             <a:fld id="{49DE2112-6E85-4D23-B7FF-3A510F2956E5}" type="datetimeFigureOut">
               <a:rPr lang="en-GB" smtClean="0"/>
-              <a:t>27/05/2018</a:t>
+              <a:t>27/05/18</a:t>
             </a:fld>
             <a:endParaRPr lang="en-GB"/>
           </a:p>
@@ -2742,7 +2742,7 @@
           <p:cNvPr id="6" name="Footer Placeholder 5">
             <a:extLst>
               <a:ext uri="{FF2B5EF4-FFF2-40B4-BE49-F238E27FC236}">
-                <a16:creationId xmlns:a16="http://schemas.microsoft.com/office/drawing/2014/main" id="{9BD1E56C-207B-4117-BE8F-D012EA963167}"/>
+                <a16:creationId xmlns:a16="http://schemas.microsoft.com/office/drawing/2014/main" xmlns="" id="{9BD1E56C-207B-4117-BE8F-D012EA963167}"/>
               </a:ext>
             </a:extLst>
           </p:cNvPr>
@@ -2767,7 +2767,7 @@
           <p:cNvPr id="7" name="Slide Number Placeholder 6">
             <a:extLst>
               <a:ext uri="{FF2B5EF4-FFF2-40B4-BE49-F238E27FC236}">
-                <a16:creationId xmlns:a16="http://schemas.microsoft.com/office/drawing/2014/main" id="{CBF2BF4C-7C73-4A8B-8578-A239A8ED1969}"/>
+                <a16:creationId xmlns:a16="http://schemas.microsoft.com/office/drawing/2014/main" xmlns="" id="{CBF2BF4C-7C73-4A8B-8578-A239A8ED1969}"/>
               </a:ext>
             </a:extLst>
           </p:cNvPr>
@@ -2834,7 +2834,7 @@
           <p:cNvPr id="2" name="Title Placeholder 1">
             <a:extLst>
               <a:ext uri="{FF2B5EF4-FFF2-40B4-BE49-F238E27FC236}">
-                <a16:creationId xmlns:a16="http://schemas.microsoft.com/office/drawing/2014/main" id="{226B4411-7611-4AB7-867F-EA632E59DE16}"/>
+                <a16:creationId xmlns:a16="http://schemas.microsoft.com/office/drawing/2014/main" xmlns="" id="{226B4411-7611-4AB7-867F-EA632E59DE16}"/>
               </a:ext>
             </a:extLst>
           </p:cNvPr>
@@ -2873,7 +2873,7 @@
           <p:cNvPr id="3" name="Text Placeholder 2">
             <a:extLst>
               <a:ext uri="{FF2B5EF4-FFF2-40B4-BE49-F238E27FC236}">
-                <a16:creationId xmlns:a16="http://schemas.microsoft.com/office/drawing/2014/main" id="{18B214FC-9141-4327-99FF-4ED132D6B0EE}"/>
+                <a16:creationId xmlns:a16="http://schemas.microsoft.com/office/drawing/2014/main" xmlns="" id="{18B214FC-9141-4327-99FF-4ED132D6B0EE}"/>
               </a:ext>
             </a:extLst>
           </p:cNvPr>
@@ -2941,7 +2941,7 @@
           <p:cNvPr id="4" name="Date Placeholder 3">
             <a:extLst>
               <a:ext uri="{FF2B5EF4-FFF2-40B4-BE49-F238E27FC236}">
-                <a16:creationId xmlns:a16="http://schemas.microsoft.com/office/drawing/2014/main" id="{03735DE1-3FB4-4AB2-A71F-BC1B74053078}"/>
+                <a16:creationId xmlns:a16="http://schemas.microsoft.com/office/drawing/2014/main" xmlns="" id="{03735DE1-3FB4-4AB2-A71F-BC1B74053078}"/>
               </a:ext>
             </a:extLst>
           </p:cNvPr>
@@ -2977,7 +2977,7 @@
           <a:p>
             <a:fld id="{49DE2112-6E85-4D23-B7FF-3A510F2956E5}" type="datetimeFigureOut">
               <a:rPr lang="en-GB" smtClean="0"/>
-              <a:t>27/05/2018</a:t>
+              <a:t>27/05/18</a:t>
             </a:fld>
             <a:endParaRPr lang="en-GB"/>
           </a:p>
@@ -2988,7 +2988,7 @@
           <p:cNvPr id="5" name="Footer Placeholder 4">
             <a:extLst>
               <a:ext uri="{FF2B5EF4-FFF2-40B4-BE49-F238E27FC236}">
-                <a16:creationId xmlns:a16="http://schemas.microsoft.com/office/drawing/2014/main" id="{7A91B44B-CBEE-461F-96B7-69130BDDEF6A}"/>
+                <a16:creationId xmlns:a16="http://schemas.microsoft.com/office/drawing/2014/main" xmlns="" id="{7A91B44B-CBEE-461F-96B7-69130BDDEF6A}"/>
               </a:ext>
             </a:extLst>
           </p:cNvPr>
@@ -3031,7 +3031,7 @@
           <p:cNvPr id="6" name="Slide Number Placeholder 5">
             <a:extLst>
               <a:ext uri="{FF2B5EF4-FFF2-40B4-BE49-F238E27FC236}">
-                <a16:creationId xmlns:a16="http://schemas.microsoft.com/office/drawing/2014/main" id="{52658FEA-567F-40AE-A1E7-6D7BCB54E0CB}"/>
+                <a16:creationId xmlns:a16="http://schemas.microsoft.com/office/drawing/2014/main" xmlns="" id="{52658FEA-567F-40AE-A1E7-6D7BCB54E0CB}"/>
               </a:ext>
             </a:extLst>
           </p:cNvPr>
@@ -3078,7 +3078,7 @@
           <p:cNvPr id="7" name="Picture 6">
             <a:extLst>
               <a:ext uri="{FF2B5EF4-FFF2-40B4-BE49-F238E27FC236}">
-                <a16:creationId xmlns:a16="http://schemas.microsoft.com/office/drawing/2014/main" id="{3F409D30-CDC1-4D8A-9D29-E0BC3D46005B}"/>
+                <a16:creationId xmlns:a16="http://schemas.microsoft.com/office/drawing/2014/main" xmlns="" id="{3F409D30-CDC1-4D8A-9D29-E0BC3D46005B}"/>
               </a:ext>
             </a:extLst>
           </p:cNvPr>
@@ -3446,7 +3446,7 @@
           <p:cNvPr id="6" name="Rectangle 5">
             <a:extLst>
               <a:ext uri="{FF2B5EF4-FFF2-40B4-BE49-F238E27FC236}">
-                <a16:creationId xmlns:a16="http://schemas.microsoft.com/office/drawing/2014/main" id="{AF3EC51E-0C1A-4CA3-AA60-7C3346FE1821}"/>
+                <a16:creationId xmlns:a16="http://schemas.microsoft.com/office/drawing/2014/main" xmlns="" id="{AF3EC51E-0C1A-4CA3-AA60-7C3346FE1821}"/>
               </a:ext>
             </a:extLst>
           </p:cNvPr>
@@ -3498,7 +3498,7 @@
           <p:cNvPr id="7" name="TextBox 6">
             <a:extLst>
               <a:ext uri="{FF2B5EF4-FFF2-40B4-BE49-F238E27FC236}">
-                <a16:creationId xmlns:a16="http://schemas.microsoft.com/office/drawing/2014/main" id="{10A273CB-6AF9-40A4-AED6-9A9260BE2C04}"/>
+                <a16:creationId xmlns:a16="http://schemas.microsoft.com/office/drawing/2014/main" xmlns="" id="{10A273CB-6AF9-40A4-AED6-9A9260BE2C04}"/>
               </a:ext>
             </a:extLst>
           </p:cNvPr>
@@ -3545,7 +3545,7 @@
           <p:cNvPr id="8" name="TextBox 7">
             <a:extLst>
               <a:ext uri="{FF2B5EF4-FFF2-40B4-BE49-F238E27FC236}">
-                <a16:creationId xmlns:a16="http://schemas.microsoft.com/office/drawing/2014/main" id="{ED028B44-D834-4C2C-8D3A-5B7E0A2A4F3F}"/>
+                <a16:creationId xmlns:a16="http://schemas.microsoft.com/office/drawing/2014/main" xmlns="" id="{ED028B44-D834-4C2C-8D3A-5B7E0A2A4F3F}"/>
               </a:ext>
             </a:extLst>
           </p:cNvPr>
@@ -3609,6 +3609,13 @@
   <p:clrMapOvr>
     <a:masterClrMapping/>
   </p:clrMapOvr>
+  <p:timing>
+    <p:tnLst>
+      <p:par>
+        <p:cTn xmlns:p14="http://schemas.microsoft.com/office/powerpoint/2010/main" id="1" dur="indefinite" restart="never" nodeType="tmRoot"/>
+      </p:par>
+    </p:tnLst>
+  </p:timing>
 </p:sld>
 </file>
 
@@ -3634,7 +3641,7 @@
           <p:cNvPr id="6" name="Rectangle 5">
             <a:extLst>
               <a:ext uri="{FF2B5EF4-FFF2-40B4-BE49-F238E27FC236}">
-                <a16:creationId xmlns:a16="http://schemas.microsoft.com/office/drawing/2014/main" id="{AF3EC51E-0C1A-4CA3-AA60-7C3346FE1821}"/>
+                <a16:creationId xmlns:a16="http://schemas.microsoft.com/office/drawing/2014/main" xmlns="" id="{AF3EC51E-0C1A-4CA3-AA60-7C3346FE1821}"/>
               </a:ext>
             </a:extLst>
           </p:cNvPr>
@@ -3686,7 +3693,7 @@
           <p:cNvPr id="5" name="Picture 4">
             <a:extLst>
               <a:ext uri="{FF2B5EF4-FFF2-40B4-BE49-F238E27FC236}">
-                <a16:creationId xmlns:a16="http://schemas.microsoft.com/office/drawing/2014/main" id="{76609774-AD35-4D8A-BA1A-DEF318FAE191}"/>
+                <a16:creationId xmlns:a16="http://schemas.microsoft.com/office/drawing/2014/main" xmlns="" id="{76609774-AD35-4D8A-BA1A-DEF318FAE191}"/>
               </a:ext>
             </a:extLst>
           </p:cNvPr>
@@ -3725,7 +3732,7 @@
           <p:cNvPr id="8" name="TextBox 7">
             <a:extLst>
               <a:ext uri="{FF2B5EF4-FFF2-40B4-BE49-F238E27FC236}">
-                <a16:creationId xmlns:a16="http://schemas.microsoft.com/office/drawing/2014/main" id="{ED028B44-D834-4C2C-8D3A-5B7E0A2A4F3F}"/>
+                <a16:creationId xmlns:a16="http://schemas.microsoft.com/office/drawing/2014/main" xmlns="" id="{ED028B44-D834-4C2C-8D3A-5B7E0A2A4F3F}"/>
               </a:ext>
             </a:extLst>
           </p:cNvPr>
@@ -3799,7 +3806,7 @@
           <p:cNvPr id="2" name="Picture 1">
             <a:extLst>
               <a:ext uri="{FF2B5EF4-FFF2-40B4-BE49-F238E27FC236}">
-                <a16:creationId xmlns:a16="http://schemas.microsoft.com/office/drawing/2014/main" id="{7C3F2696-235F-4E67-97DB-0CD9B05CF94B}"/>
+                <a16:creationId xmlns:a16="http://schemas.microsoft.com/office/drawing/2014/main" xmlns="" id="{7C3F2696-235F-4E67-97DB-0CD9B05CF94B}"/>
               </a:ext>
             </a:extLst>
           </p:cNvPr>
@@ -3834,6 +3841,13 @@
   <p:clrMapOvr>
     <a:masterClrMapping/>
   </p:clrMapOvr>
+  <p:timing>
+    <p:tnLst>
+      <p:par>
+        <p:cTn xmlns:p14="http://schemas.microsoft.com/office/powerpoint/2010/main" id="1" dur="indefinite" restart="never" nodeType="tmRoot"/>
+      </p:par>
+    </p:tnLst>
+  </p:timing>
 </p:sld>
 </file>
 
@@ -3859,7 +3873,7 @@
           <p:cNvPr id="6" name="Rectangle 5">
             <a:extLst>
               <a:ext uri="{FF2B5EF4-FFF2-40B4-BE49-F238E27FC236}">
-                <a16:creationId xmlns:a16="http://schemas.microsoft.com/office/drawing/2014/main" id="{AF3EC51E-0C1A-4CA3-AA60-7C3346FE1821}"/>
+                <a16:creationId xmlns:a16="http://schemas.microsoft.com/office/drawing/2014/main" xmlns="" id="{AF3EC51E-0C1A-4CA3-AA60-7C3346FE1821}"/>
               </a:ext>
             </a:extLst>
           </p:cNvPr>
@@ -3911,7 +3925,7 @@
           <p:cNvPr id="8" name="TextBox 7">
             <a:extLst>
               <a:ext uri="{FF2B5EF4-FFF2-40B4-BE49-F238E27FC236}">
-                <a16:creationId xmlns:a16="http://schemas.microsoft.com/office/drawing/2014/main" id="{ED028B44-D834-4C2C-8D3A-5B7E0A2A4F3F}"/>
+                <a16:creationId xmlns:a16="http://schemas.microsoft.com/office/drawing/2014/main" xmlns="" id="{ED028B44-D834-4C2C-8D3A-5B7E0A2A4F3F}"/>
               </a:ext>
             </a:extLst>
           </p:cNvPr>
@@ -3967,7 +3981,7 @@
           <p:cNvPr id="3" name="Picture 2">
             <a:extLst>
               <a:ext uri="{FF2B5EF4-FFF2-40B4-BE49-F238E27FC236}">
-                <a16:creationId xmlns:a16="http://schemas.microsoft.com/office/drawing/2014/main" id="{39EDADE6-C326-4056-A54E-E71A9CA8A6BD}"/>
+                <a16:creationId xmlns:a16="http://schemas.microsoft.com/office/drawing/2014/main" xmlns="" id="{39EDADE6-C326-4056-A54E-E71A9CA8A6BD}"/>
               </a:ext>
             </a:extLst>
           </p:cNvPr>
@@ -4002,6 +4016,13 @@
   <p:clrMapOvr>
     <a:masterClrMapping/>
   </p:clrMapOvr>
+  <p:timing>
+    <p:tnLst>
+      <p:par>
+        <p:cTn xmlns:p14="http://schemas.microsoft.com/office/powerpoint/2010/main" id="1" dur="indefinite" restart="never" nodeType="tmRoot"/>
+      </p:par>
+    </p:tnLst>
+  </p:timing>
 </p:sld>
 </file>
 
@@ -4027,7 +4048,7 @@
           <p:cNvPr id="8" name="TextBox 7">
             <a:extLst>
               <a:ext uri="{FF2B5EF4-FFF2-40B4-BE49-F238E27FC236}">
-                <a16:creationId xmlns:a16="http://schemas.microsoft.com/office/drawing/2014/main" id="{ED028B44-D834-4C2C-8D3A-5B7E0A2A4F3F}"/>
+                <a16:creationId xmlns:a16="http://schemas.microsoft.com/office/drawing/2014/main" xmlns="" id="{ED028B44-D834-4C2C-8D3A-5B7E0A2A4F3F}"/>
               </a:ext>
             </a:extLst>
           </p:cNvPr>
@@ -4092,7 +4113,7 @@
           <p:cNvPr id="2" name="Picture 1">
             <a:extLst>
               <a:ext uri="{FF2B5EF4-FFF2-40B4-BE49-F238E27FC236}">
-                <a16:creationId xmlns:a16="http://schemas.microsoft.com/office/drawing/2014/main" id="{C3F053FC-7AC7-4FC5-8900-822CD684AFEF}"/>
+                <a16:creationId xmlns:a16="http://schemas.microsoft.com/office/drawing/2014/main" xmlns="" id="{C3F053FC-7AC7-4FC5-8900-822CD684AFEF}"/>
               </a:ext>
             </a:extLst>
           </p:cNvPr>
@@ -4127,6 +4148,13 @@
   <p:clrMapOvr>
     <a:masterClrMapping/>
   </p:clrMapOvr>
+  <p:timing>
+    <p:tnLst>
+      <p:par>
+        <p:cTn xmlns:p14="http://schemas.microsoft.com/office/powerpoint/2010/main" id="1" dur="indefinite" restart="never" nodeType="tmRoot"/>
+      </p:par>
+    </p:tnLst>
+  </p:timing>
 </p:sld>
 </file>
 
@@ -4152,7 +4180,7 @@
           <p:cNvPr id="6" name="Rectangle 5">
             <a:extLst>
               <a:ext uri="{FF2B5EF4-FFF2-40B4-BE49-F238E27FC236}">
-                <a16:creationId xmlns:a16="http://schemas.microsoft.com/office/drawing/2014/main" id="{AF3EC51E-0C1A-4CA3-AA60-7C3346FE1821}"/>
+                <a16:creationId xmlns:a16="http://schemas.microsoft.com/office/drawing/2014/main" xmlns="" id="{AF3EC51E-0C1A-4CA3-AA60-7C3346FE1821}"/>
               </a:ext>
             </a:extLst>
           </p:cNvPr>
@@ -4204,7 +4232,7 @@
           <p:cNvPr id="3" name="Picture 2">
             <a:extLst>
               <a:ext uri="{FF2B5EF4-FFF2-40B4-BE49-F238E27FC236}">
-                <a16:creationId xmlns:a16="http://schemas.microsoft.com/office/drawing/2014/main" id="{6D484CB8-1D08-44CF-B298-65F435CC63B1}"/>
+                <a16:creationId xmlns:a16="http://schemas.microsoft.com/office/drawing/2014/main" xmlns="" id="{6D484CB8-1D08-44CF-B298-65F435CC63B1}"/>
               </a:ext>
             </a:extLst>
           </p:cNvPr>
@@ -4234,7 +4262,7 @@
           <p:cNvPr id="8" name="TextBox 7">
             <a:extLst>
               <a:ext uri="{FF2B5EF4-FFF2-40B4-BE49-F238E27FC236}">
-                <a16:creationId xmlns:a16="http://schemas.microsoft.com/office/drawing/2014/main" id="{ED028B44-D834-4C2C-8D3A-5B7E0A2A4F3F}"/>
+                <a16:creationId xmlns:a16="http://schemas.microsoft.com/office/drawing/2014/main" xmlns="" id="{ED028B44-D834-4C2C-8D3A-5B7E0A2A4F3F}"/>
               </a:ext>
             </a:extLst>
           </p:cNvPr>
@@ -4322,6 +4350,13 @@
   <p:clrMapOvr>
     <a:masterClrMapping/>
   </p:clrMapOvr>
+  <p:timing>
+    <p:tnLst>
+      <p:par>
+        <p:cTn xmlns:p14="http://schemas.microsoft.com/office/powerpoint/2010/main" id="1" dur="indefinite" restart="never" nodeType="tmRoot"/>
+      </p:par>
+    </p:tnLst>
+  </p:timing>
 </p:sld>
 </file>
 
@@ -4347,7 +4382,7 @@
           <p:cNvPr id="6" name="Rectangle 5">
             <a:extLst>
               <a:ext uri="{FF2B5EF4-FFF2-40B4-BE49-F238E27FC236}">
-                <a16:creationId xmlns:a16="http://schemas.microsoft.com/office/drawing/2014/main" id="{AF3EC51E-0C1A-4CA3-AA60-7C3346FE1821}"/>
+                <a16:creationId xmlns:a16="http://schemas.microsoft.com/office/drawing/2014/main" xmlns="" id="{AF3EC51E-0C1A-4CA3-AA60-7C3346FE1821}"/>
               </a:ext>
             </a:extLst>
           </p:cNvPr>
@@ -4399,7 +4434,7 @@
           <p:cNvPr id="8" name="TextBox 7">
             <a:extLst>
               <a:ext uri="{FF2B5EF4-FFF2-40B4-BE49-F238E27FC236}">
-                <a16:creationId xmlns:a16="http://schemas.microsoft.com/office/drawing/2014/main" id="{ED028B44-D834-4C2C-8D3A-5B7E0A2A4F3F}"/>
+                <a16:creationId xmlns:a16="http://schemas.microsoft.com/office/drawing/2014/main" xmlns="" id="{ED028B44-D834-4C2C-8D3A-5B7E0A2A4F3F}"/>
               </a:ext>
             </a:extLst>
           </p:cNvPr>
@@ -4469,6 +4504,13 @@
   <p:clrMapOvr>
     <a:masterClrMapping/>
   </p:clrMapOvr>
+  <p:timing>
+    <p:tnLst>
+      <p:par>
+        <p:cTn xmlns:p14="http://schemas.microsoft.com/office/powerpoint/2010/main" id="1" dur="indefinite" restart="never" nodeType="tmRoot"/>
+      </p:par>
+    </p:tnLst>
+  </p:timing>
 </p:sld>
 </file>
 
@@ -4494,7 +4536,7 @@
           <p:cNvPr id="6" name="Rectangle 5">
             <a:extLst>
               <a:ext uri="{FF2B5EF4-FFF2-40B4-BE49-F238E27FC236}">
-                <a16:creationId xmlns:a16="http://schemas.microsoft.com/office/drawing/2014/main" id="{AF3EC51E-0C1A-4CA3-AA60-7C3346FE1821}"/>
+                <a16:creationId xmlns:a16="http://schemas.microsoft.com/office/drawing/2014/main" xmlns="" id="{AF3EC51E-0C1A-4CA3-AA60-7C3346FE1821}"/>
               </a:ext>
             </a:extLst>
           </p:cNvPr>
@@ -4546,7 +4588,7 @@
           <p:cNvPr id="7" name="Document Analysis">
             <a:extLst>
               <a:ext uri="{FF2B5EF4-FFF2-40B4-BE49-F238E27FC236}">
-                <a16:creationId xmlns:a16="http://schemas.microsoft.com/office/drawing/2014/main" id="{19E3B47F-0A5B-4E18-8F48-AF1090A99F98}"/>
+                <a16:creationId xmlns:a16="http://schemas.microsoft.com/office/drawing/2014/main" xmlns="" id="{19E3B47F-0A5B-4E18-8F48-AF1090A99F98}"/>
               </a:ext>
             </a:extLst>
           </p:cNvPr>
@@ -4605,7 +4647,7 @@
           <p:cNvPr id="10" name="Health Insurance and Work Contracts are long and complicated…">
             <a:extLst>
               <a:ext uri="{FF2B5EF4-FFF2-40B4-BE49-F238E27FC236}">
-                <a16:creationId xmlns:a16="http://schemas.microsoft.com/office/drawing/2014/main" id="{BD3C1280-6CC2-46C3-8C95-6DD97B7EABFA}"/>
+                <a16:creationId xmlns:a16="http://schemas.microsoft.com/office/drawing/2014/main" xmlns="" id="{BD3C1280-6CC2-46C3-8C95-6DD97B7EABFA}"/>
               </a:ext>
             </a:extLst>
           </p:cNvPr>
@@ -4625,7 +4667,7 @@
           </a:ln>
           <a:extLst>
             <a:ext uri="{C572A759-6A51-4108-AA02-DFA0A04FC94B}">
-              <ma14:wrappingTextBoxFlag xmlns="" xmlns:ma14="http://schemas.microsoft.com/office/mac/drawingml/2011/main" val="1"/>
+              <ma14:wrappingTextBoxFlag xmlns:ma14="http://schemas.microsoft.com/office/mac/drawingml/2011/main" val="1"/>
             </a:ext>
           </a:extLst>
         </p:spPr>
@@ -4654,7 +4696,7 @@
           <p:cNvPr id="12" name="TextBox 11">
             <a:extLst>
               <a:ext uri="{FF2B5EF4-FFF2-40B4-BE49-F238E27FC236}">
-                <a16:creationId xmlns:a16="http://schemas.microsoft.com/office/drawing/2014/main" id="{D6744F4C-41C8-4992-B7BA-F808F2029E72}"/>
+                <a16:creationId xmlns:a16="http://schemas.microsoft.com/office/drawing/2014/main" xmlns="" id="{D6744F4C-41C8-4992-B7BA-F808F2029E72}"/>
               </a:ext>
             </a:extLst>
           </p:cNvPr>
@@ -4791,6 +4833,13 @@
   <p:clrMapOvr>
     <a:masterClrMapping/>
   </p:clrMapOvr>
+  <p:timing>
+    <p:tnLst>
+      <p:par>
+        <p:cTn xmlns:p14="http://schemas.microsoft.com/office/powerpoint/2010/main" id="1" dur="indefinite" restart="never" nodeType="tmRoot"/>
+      </p:par>
+    </p:tnLst>
+  </p:timing>
 </p:sld>
 </file>
 
@@ -4816,7 +4865,7 @@
           <p:cNvPr id="6" name="Rectangle 5">
             <a:extLst>
               <a:ext uri="{FF2B5EF4-FFF2-40B4-BE49-F238E27FC236}">
-                <a16:creationId xmlns:a16="http://schemas.microsoft.com/office/drawing/2014/main" id="{AF3EC51E-0C1A-4CA3-AA60-7C3346FE1821}"/>
+                <a16:creationId xmlns:a16="http://schemas.microsoft.com/office/drawing/2014/main" xmlns="" id="{AF3EC51E-0C1A-4CA3-AA60-7C3346FE1821}"/>
               </a:ext>
             </a:extLst>
           </p:cNvPr>
@@ -4868,7 +4917,7 @@
           <p:cNvPr id="10" name="Health Insurance and Work Contracts are long and complicated…">
             <a:extLst>
               <a:ext uri="{FF2B5EF4-FFF2-40B4-BE49-F238E27FC236}">
-                <a16:creationId xmlns:a16="http://schemas.microsoft.com/office/drawing/2014/main" id="{BD3C1280-6CC2-46C3-8C95-6DD97B7EABFA}"/>
+                <a16:creationId xmlns:a16="http://schemas.microsoft.com/office/drawing/2014/main" xmlns="" id="{BD3C1280-6CC2-46C3-8C95-6DD97B7EABFA}"/>
               </a:ext>
             </a:extLst>
           </p:cNvPr>
@@ -4888,7 +4937,7 @@
           </a:ln>
           <a:extLst>
             <a:ext uri="{C572A759-6A51-4108-AA02-DFA0A04FC94B}">
-              <ma14:wrappingTextBoxFlag xmlns="" xmlns:ma14="http://schemas.microsoft.com/office/mac/drawingml/2011/main" val="1"/>
+              <ma14:wrappingTextBoxFlag xmlns:ma14="http://schemas.microsoft.com/office/mac/drawingml/2011/main" val="1"/>
             </a:ext>
           </a:extLst>
         </p:spPr>
@@ -4917,7 +4966,7 @@
           <p:cNvPr id="2" name="Picture 1">
             <a:extLst>
               <a:ext uri="{FF2B5EF4-FFF2-40B4-BE49-F238E27FC236}">
-                <a16:creationId xmlns:a16="http://schemas.microsoft.com/office/drawing/2014/main" id="{E84B438D-474E-4378-8A86-32FB2BDF4400}"/>
+                <a16:creationId xmlns:a16="http://schemas.microsoft.com/office/drawing/2014/main" xmlns="" id="{E84B438D-474E-4378-8A86-32FB2BDF4400}"/>
               </a:ext>
             </a:extLst>
           </p:cNvPr>
@@ -4942,6 +4991,92 @@
           </a:prstGeom>
         </p:spPr>
       </p:pic>
+      <p:sp>
+        <p:nvSpPr>
+          <p:cNvPr id="3" name="Rectangle 2"/>
+          <p:cNvSpPr/>
+          <p:nvPr/>
+        </p:nvSpPr>
+        <p:spPr>
+          <a:xfrm>
+            <a:off x="3299777" y="3685362"/>
+            <a:ext cx="1436496" cy="333140"/>
+          </a:xfrm>
+          <a:prstGeom prst="rect">
+            <a:avLst/>
+          </a:prstGeom>
+          <a:solidFill>
+            <a:srgbClr val="4195F7"/>
+          </a:solidFill>
+          <a:ln>
+            <a:noFill/>
+          </a:ln>
+        </p:spPr>
+        <p:style>
+          <a:lnRef idx="1">
+            <a:schemeClr val="accent1"/>
+          </a:lnRef>
+          <a:fillRef idx="3">
+            <a:schemeClr val="accent1"/>
+          </a:fillRef>
+          <a:effectRef idx="2">
+            <a:schemeClr val="accent1"/>
+          </a:effectRef>
+          <a:fontRef idx="minor">
+            <a:schemeClr val="lt1"/>
+          </a:fontRef>
+        </p:style>
+        <p:txBody>
+          <a:bodyPr rtlCol="0" anchor="ctr"/>
+          <a:lstStyle/>
+          <a:p>
+            <a:pPr algn="ctr"/>
+            <a:endParaRPr lang="en-US"/>
+          </a:p>
+        </p:txBody>
+      </p:sp>
+      <p:sp>
+        <p:nvSpPr>
+          <p:cNvPr id="4" name="TextBox 3"/>
+          <p:cNvSpPr txBox="1"/>
+          <p:nvPr/>
+        </p:nvSpPr>
+        <p:spPr>
+          <a:xfrm>
+            <a:off x="3403871" y="3716594"/>
+            <a:ext cx="1427720" cy="276999"/>
+          </a:xfrm>
+          <a:prstGeom prst="rect">
+            <a:avLst/>
+          </a:prstGeom>
+          <a:noFill/>
+        </p:spPr>
+        <p:txBody>
+          <a:bodyPr wrap="none" rtlCol="0">
+            <a:spAutoFit/>
+          </a:bodyPr>
+          <a:lstStyle/>
+          <a:p>
+            <a:r>
+              <a:rPr lang="en-US" sz="1200" dirty="0" smtClean="0">
+                <a:solidFill>
+                  <a:schemeClr val="bg1"/>
+                </a:solidFill>
+                <a:latin typeface="Arial Black"/>
+                <a:cs typeface="Arial Black"/>
+              </a:rPr>
+              <a:t>Lemmatization</a:t>
+            </a:r>
+            <a:endParaRPr lang="en-US" sz="1200" dirty="0">
+              <a:solidFill>
+                <a:schemeClr val="bg1"/>
+              </a:solidFill>
+              <a:latin typeface="Arial Black"/>
+              <a:cs typeface="Arial Black"/>
+            </a:endParaRPr>
+          </a:p>
+        </p:txBody>
+      </p:sp>
     </p:spTree>
     <p:extLst>
       <p:ext uri="{BB962C8B-B14F-4D97-AF65-F5344CB8AC3E}">
@@ -4952,6 +5087,13 @@
   <p:clrMapOvr>
     <a:masterClrMapping/>
   </p:clrMapOvr>
+  <p:timing>
+    <p:tnLst>
+      <p:par>
+        <p:cTn xmlns:p14="http://schemas.microsoft.com/office/powerpoint/2010/main" id="1" dur="indefinite" restart="never" nodeType="tmRoot"/>
+      </p:par>
+    </p:tnLst>
+  </p:timing>
 </p:sld>
 </file>
 
@@ -4977,7 +5119,7 @@
           <p:cNvPr id="7" name="Document Analysis">
             <a:extLst>
               <a:ext uri="{FF2B5EF4-FFF2-40B4-BE49-F238E27FC236}">
-                <a16:creationId xmlns:a16="http://schemas.microsoft.com/office/drawing/2014/main" id="{19E3B47F-0A5B-4E18-8F48-AF1090A99F98}"/>
+                <a16:creationId xmlns:a16="http://schemas.microsoft.com/office/drawing/2014/main" xmlns="" id="{19E3B47F-0A5B-4E18-8F48-AF1090A99F98}"/>
               </a:ext>
             </a:extLst>
           </p:cNvPr>
@@ -5041,7 +5183,7 @@
           <p:cNvPr id="10" name="Health Insurance and Work Contracts are long and complicated…">
             <a:extLst>
               <a:ext uri="{FF2B5EF4-FFF2-40B4-BE49-F238E27FC236}">
-                <a16:creationId xmlns:a16="http://schemas.microsoft.com/office/drawing/2014/main" id="{BD3C1280-6CC2-46C3-8C95-6DD97B7EABFA}"/>
+                <a16:creationId xmlns:a16="http://schemas.microsoft.com/office/drawing/2014/main" xmlns="" id="{BD3C1280-6CC2-46C3-8C95-6DD97B7EABFA}"/>
               </a:ext>
             </a:extLst>
           </p:cNvPr>
@@ -5061,7 +5203,7 @@
           </a:ln>
           <a:extLst>
             <a:ext uri="{C572A759-6A51-4108-AA02-DFA0A04FC94B}">
-              <ma14:wrappingTextBoxFlag xmlns="" xmlns:ma14="http://schemas.microsoft.com/office/mac/drawingml/2011/main" val="1"/>
+              <ma14:wrappingTextBoxFlag xmlns:ma14="http://schemas.microsoft.com/office/mac/drawingml/2011/main" val="1"/>
             </a:ext>
           </a:extLst>
         </p:spPr>
@@ -5095,6 +5237,13 @@
   <p:clrMapOvr>
     <a:masterClrMapping/>
   </p:clrMapOvr>
+  <p:timing>
+    <p:tnLst>
+      <p:par>
+        <p:cTn xmlns:p14="http://schemas.microsoft.com/office/powerpoint/2010/main" id="1" dur="indefinite" restart="never" nodeType="tmRoot"/>
+      </p:par>
+    </p:tnLst>
+  </p:timing>
 </p:sld>
 </file>
 
@@ -5141,7 +5290,7 @@
     </a:clrScheme>
     <a:fontScheme name="Office">
       <a:majorFont>
-        <a:latin typeface="Calibri Light" panose="020F0302020204030204"/>
+        <a:latin typeface="Calibri Light"/>
         <a:ea typeface=""/>
         <a:cs typeface=""/>
         <a:font script="Jpan" typeface="游ゴシック Light"/>
@@ -5193,7 +5342,7 @@
         <a:font script="Tfng" typeface="Ebrima"/>
       </a:majorFont>
       <a:minorFont>
-        <a:latin typeface="Calibri" panose="020F0502020204030204"/>
+        <a:latin typeface="Calibri"/>
         <a:ea typeface=""/>
         <a:cs typeface=""/>
         <a:font script="Jpan" typeface="游ゴシック"/>
@@ -5387,7 +5536,7 @@
   <a:extraClrSchemeLst/>
   <a:extLst>
     <a:ext uri="{05A4C25C-085E-4340-85A3-A5531E510DB2}">
-      <thm15:themeFamily xmlns:thm15="http://schemas.microsoft.com/office/thememl/2012/main" name="Office Theme" id="{62F939B6-93AF-4DB8-9C6B-D6C7DFDC589F}" vid="{4A3C46E8-61CC-4603-A589-7422A47A8E4A}"/>
+      <thm15:themeFamily xmlns:thm15="http://schemas.microsoft.com/office/thememl/2012/main" xmlns="" name="Office Theme" id="{62F939B6-93AF-4DB8-9C6B-D6C7DFDC589F}" vid="{4A3C46E8-61CC-4603-A589-7422A47A8E4A}"/>
     </a:ext>
   </a:extLst>
 </a:theme>

</xml_diff>